<commit_message>
update graphs and analysis
</commit_message>
<xml_diff>
--- a/causalgraphs.pptx
+++ b/causalgraphs.pptx
@@ -7,6 +7,7 @@
   <p:sldIdLst>
     <p:sldId id="257" r:id="rId2"/>
     <p:sldId id="258" r:id="rId3"/>
+    <p:sldId id="260" r:id="rId4"/>
   </p:sldIdLst>
   <p:sldSz cx="12192000" cy="11879263"/>
   <p:notesSz cx="6858000" cy="9144000"/>
@@ -244,7 +245,7 @@
           <a:p>
             <a:fld id="{0242246C-62F8-8D41-AE20-12536F7DA5C0}" type="datetimeFigureOut">
               <a:rPr lang="en-US" smtClean="0"/>
-              <a:t>4/30/22</a:t>
+              <a:t>5/3/22</a:t>
             </a:fld>
             <a:endParaRPr lang="en-US"/>
           </a:p>
@@ -414,7 +415,7 @@
           <a:p>
             <a:fld id="{0242246C-62F8-8D41-AE20-12536F7DA5C0}" type="datetimeFigureOut">
               <a:rPr lang="en-US" smtClean="0"/>
-              <a:t>4/30/22</a:t>
+              <a:t>5/3/22</a:t>
             </a:fld>
             <a:endParaRPr lang="en-US"/>
           </a:p>
@@ -594,7 +595,7 @@
           <a:p>
             <a:fld id="{0242246C-62F8-8D41-AE20-12536F7DA5C0}" type="datetimeFigureOut">
               <a:rPr lang="en-US" smtClean="0"/>
-              <a:t>4/30/22</a:t>
+              <a:t>5/3/22</a:t>
             </a:fld>
             <a:endParaRPr lang="en-US"/>
           </a:p>
@@ -764,7 +765,7 @@
           <a:p>
             <a:fld id="{0242246C-62F8-8D41-AE20-12536F7DA5C0}" type="datetimeFigureOut">
               <a:rPr lang="en-US" smtClean="0"/>
-              <a:t>4/30/22</a:t>
+              <a:t>5/3/22</a:t>
             </a:fld>
             <a:endParaRPr lang="en-US"/>
           </a:p>
@@ -1008,7 +1009,7 @@
           <a:p>
             <a:fld id="{0242246C-62F8-8D41-AE20-12536F7DA5C0}" type="datetimeFigureOut">
               <a:rPr lang="en-US" smtClean="0"/>
-              <a:t>4/30/22</a:t>
+              <a:t>5/3/22</a:t>
             </a:fld>
             <a:endParaRPr lang="en-US"/>
           </a:p>
@@ -1240,7 +1241,7 @@
           <a:p>
             <a:fld id="{0242246C-62F8-8D41-AE20-12536F7DA5C0}" type="datetimeFigureOut">
               <a:rPr lang="en-US" smtClean="0"/>
-              <a:t>4/30/22</a:t>
+              <a:t>5/3/22</a:t>
             </a:fld>
             <a:endParaRPr lang="en-US"/>
           </a:p>
@@ -1607,7 +1608,7 @@
           <a:p>
             <a:fld id="{0242246C-62F8-8D41-AE20-12536F7DA5C0}" type="datetimeFigureOut">
               <a:rPr lang="en-US" smtClean="0"/>
-              <a:t>4/30/22</a:t>
+              <a:t>5/3/22</a:t>
             </a:fld>
             <a:endParaRPr lang="en-US"/>
           </a:p>
@@ -1725,7 +1726,7 @@
           <a:p>
             <a:fld id="{0242246C-62F8-8D41-AE20-12536F7DA5C0}" type="datetimeFigureOut">
               <a:rPr lang="en-US" smtClean="0"/>
-              <a:t>4/30/22</a:t>
+              <a:t>5/3/22</a:t>
             </a:fld>
             <a:endParaRPr lang="en-US"/>
           </a:p>
@@ -1820,7 +1821,7 @@
           <a:p>
             <a:fld id="{0242246C-62F8-8D41-AE20-12536F7DA5C0}" type="datetimeFigureOut">
               <a:rPr lang="en-US" smtClean="0"/>
-              <a:t>4/30/22</a:t>
+              <a:t>5/3/22</a:t>
             </a:fld>
             <a:endParaRPr lang="en-US"/>
           </a:p>
@@ -2097,7 +2098,7 @@
           <a:p>
             <a:fld id="{0242246C-62F8-8D41-AE20-12536F7DA5C0}" type="datetimeFigureOut">
               <a:rPr lang="en-US" smtClean="0"/>
-              <a:t>4/30/22</a:t>
+              <a:t>5/3/22</a:t>
             </a:fld>
             <a:endParaRPr lang="en-US"/>
           </a:p>
@@ -2354,7 +2355,7 @@
           <a:p>
             <a:fld id="{0242246C-62F8-8D41-AE20-12536F7DA5C0}" type="datetimeFigureOut">
               <a:rPr lang="en-US" smtClean="0"/>
-              <a:t>4/30/22</a:t>
+              <a:t>5/3/22</a:t>
             </a:fld>
             <a:endParaRPr lang="en-US"/>
           </a:p>
@@ -2567,7 +2568,7 @@
           <a:p>
             <a:fld id="{0242246C-62F8-8D41-AE20-12536F7DA5C0}" type="datetimeFigureOut">
               <a:rPr lang="en-US" smtClean="0"/>
-              <a:t>4/30/22</a:t>
+              <a:t>5/3/22</a:t>
             </a:fld>
             <a:endParaRPr lang="en-US"/>
           </a:p>
@@ -3106,9 +3107,9 @@
             <p:nvPr/>
           </p:nvCxnSpPr>
           <p:spPr>
-            <a:xfrm flipH="1">
-              <a:off x="4621547" y="1547874"/>
-              <a:ext cx="578833" cy="15104"/>
+            <a:xfrm flipH="1" flipV="1">
+              <a:off x="4621547" y="1541713"/>
+              <a:ext cx="578833" cy="6161"/>
             </a:xfrm>
             <a:prstGeom prst="straightConnector1">
               <a:avLst/>
@@ -3330,7 +3331,7 @@
           </p:nvSpPr>
           <p:spPr>
             <a:xfrm>
-              <a:off x="2821547" y="662978"/>
+              <a:off x="2821547" y="641713"/>
               <a:ext cx="1800000" cy="1800000"/>
             </a:xfrm>
             <a:prstGeom prst="ellipse">
@@ -3440,8 +3441,8 @@
           </p:nvCxnSpPr>
           <p:spPr>
             <a:xfrm flipH="1">
-              <a:off x="3712381" y="2462978"/>
-              <a:ext cx="9166" cy="186019"/>
+              <a:off x="3712381" y="2441713"/>
+              <a:ext cx="9166" cy="207284"/>
             </a:xfrm>
             <a:prstGeom prst="straightConnector1">
               <a:avLst/>
@@ -4452,7 +4453,7 @@
           <p:cNvPr id="2" name="Group 1">
             <a:extLst>
               <a:ext uri="{FF2B5EF4-FFF2-40B4-BE49-F238E27FC236}">
-                <a16:creationId xmlns:a16="http://schemas.microsoft.com/office/drawing/2014/main" id="{C4438789-075C-3DC8-12BB-04AD3F155BC7}"/>
+                <a16:creationId xmlns:a16="http://schemas.microsoft.com/office/drawing/2014/main" id="{F6D2B13A-4DC7-E4DE-94E9-70A60A7C2CC6}"/>
               </a:ext>
             </a:extLst>
           </p:cNvPr>
@@ -4461,10 +4462,10 @@
         </p:nvGrpSpPr>
         <p:grpSpPr>
           <a:xfrm>
-            <a:off x="1177134" y="826153"/>
-            <a:ext cx="8503937" cy="5113478"/>
-            <a:chOff x="1177134" y="826153"/>
-            <a:chExt cx="8503937" cy="5113478"/>
+            <a:off x="974534" y="826153"/>
+            <a:ext cx="9798236" cy="5113478"/>
+            <a:chOff x="974534" y="826153"/>
+            <a:chExt cx="9798236" cy="5113478"/>
           </a:xfrm>
         </p:grpSpPr>
         <p:grpSp>
@@ -4639,10 +4640,6 @@
                   <a:t>Childhood Lead Exposure</a:t>
                 </a:r>
               </a:p>
-              <a:p>
-                <a:pPr algn="ctr"/>
-                <a:endParaRPr lang="en-US" sz="1550" dirty="0"/>
-              </a:p>
             </p:txBody>
           </p:sp>
           <p:sp>
@@ -4907,8 +4904,8 @@
           </p:nvSpPr>
           <p:spPr>
             <a:xfrm>
-              <a:off x="6762307" y="3059724"/>
-              <a:ext cx="2086613" cy="646331"/>
+              <a:off x="8837072" y="3059724"/>
+              <a:ext cx="1935698" cy="923330"/>
             </a:xfrm>
             <a:prstGeom prst="rect">
               <a:avLst/>
@@ -4927,8 +4924,13 @@
               </a:r>
               <a:r>
                 <a:rPr lang="en-US" dirty="0"/>
-                <a:t>Evidence exists, but no analysis</a:t>
+                <a:t>Evidence exists, but we did not </a:t>
               </a:r>
+              <a:r>
+                <a:rPr lang="en-US" dirty="0" err="1"/>
+                <a:t>analyse</a:t>
+              </a:r>
+              <a:endParaRPr lang="en-US" dirty="0"/>
             </a:p>
           </p:txBody>
         </p:sp>
@@ -4946,8 +4948,8 @@
           </p:nvSpPr>
           <p:spPr>
             <a:xfrm>
-              <a:off x="1177134" y="3059725"/>
-              <a:ext cx="1309209" cy="646331"/>
+              <a:off x="974534" y="3059725"/>
+              <a:ext cx="1511810" cy="646331"/>
             </a:xfrm>
             <a:prstGeom prst="rect">
               <a:avLst/>
@@ -5012,6 +5014,368 @@
     <p:extLst>
       <p:ext uri="{BB962C8B-B14F-4D97-AF65-F5344CB8AC3E}">
         <p14:creationId xmlns:p14="http://schemas.microsoft.com/office/powerpoint/2010/main" val="4239878614"/>
+      </p:ext>
+    </p:extLst>
+  </p:cSld>
+  <p:clrMapOvr>
+    <a:masterClrMapping/>
+  </p:clrMapOvr>
+</p:sld>
+</file>
+
+<file path=ppt/slides/slide3.xml><?xml version="1.0" encoding="utf-8"?>
+<p:sld xmlns:a="http://schemas.openxmlformats.org/drawingml/2006/main" xmlns:r="http://schemas.openxmlformats.org/officeDocument/2006/relationships" xmlns:p="http://schemas.openxmlformats.org/presentationml/2006/main">
+  <p:cSld>
+    <p:spTree>
+      <p:nvGrpSpPr>
+        <p:cNvPr id="1" name=""/>
+        <p:cNvGrpSpPr/>
+        <p:nvPr/>
+      </p:nvGrpSpPr>
+      <p:grpSpPr>
+        <a:xfrm>
+          <a:off x="0" y="0"/>
+          <a:ext cx="0" cy="0"/>
+          <a:chOff x="0" y="0"/>
+          <a:chExt cx="0" cy="0"/>
+        </a:xfrm>
+      </p:grpSpPr>
+      <p:grpSp>
+        <p:nvGrpSpPr>
+          <p:cNvPr id="10" name="Group 9">
+            <a:extLst>
+              <a:ext uri="{FF2B5EF4-FFF2-40B4-BE49-F238E27FC236}">
+                <a16:creationId xmlns:a16="http://schemas.microsoft.com/office/drawing/2014/main" id="{14D7AF4C-2ADD-D934-F254-899598B65189}"/>
+              </a:ext>
+            </a:extLst>
+          </p:cNvPr>
+          <p:cNvGrpSpPr/>
+          <p:nvPr/>
+        </p:nvGrpSpPr>
+        <p:grpSpPr>
+          <a:xfrm>
+            <a:off x="156368" y="0"/>
+            <a:ext cx="11879263" cy="11879263"/>
+            <a:chOff x="156368" y="0"/>
+            <a:chExt cx="11879263" cy="11879263"/>
+          </a:xfrm>
+        </p:grpSpPr>
+        <p:grpSp>
+          <p:nvGrpSpPr>
+            <p:cNvPr id="8" name="Group 7">
+              <a:extLst>
+                <a:ext uri="{FF2B5EF4-FFF2-40B4-BE49-F238E27FC236}">
+                  <a16:creationId xmlns:a16="http://schemas.microsoft.com/office/drawing/2014/main" id="{074D0422-202B-8948-C018-7EC24D9524CB}"/>
+                </a:ext>
+              </a:extLst>
+            </p:cNvPr>
+            <p:cNvGrpSpPr/>
+            <p:nvPr/>
+          </p:nvGrpSpPr>
+          <p:grpSpPr>
+            <a:xfrm>
+              <a:off x="156368" y="0"/>
+              <a:ext cx="11879263" cy="11879263"/>
+              <a:chOff x="156368" y="0"/>
+              <a:chExt cx="11879263" cy="11879263"/>
+            </a:xfrm>
+          </p:grpSpPr>
+          <p:pic>
+            <p:nvPicPr>
+              <p:cNvPr id="3" name="Picture 2" descr="Shape&#10;&#10;Description automatically generated with low confidence">
+                <a:extLst>
+                  <a:ext uri="{FF2B5EF4-FFF2-40B4-BE49-F238E27FC236}">
+                    <a16:creationId xmlns:a16="http://schemas.microsoft.com/office/drawing/2014/main" id="{F5945B90-6DF2-2702-51AF-234B7CB27B3A}"/>
+                  </a:ext>
+                </a:extLst>
+              </p:cNvPr>
+              <p:cNvPicPr>
+                <a:picLocks noChangeAspect="1"/>
+              </p:cNvPicPr>
+              <p:nvPr/>
+            </p:nvPicPr>
+            <p:blipFill>
+              <a:blip r:embed="rId2"/>
+              <a:stretch>
+                <a:fillRect/>
+              </a:stretch>
+            </p:blipFill>
+            <p:spPr>
+              <a:xfrm>
+                <a:off x="156368" y="0"/>
+                <a:ext cx="11879263" cy="11879263"/>
+              </a:xfrm>
+              <a:prstGeom prst="rect">
+                <a:avLst/>
+              </a:prstGeom>
+            </p:spPr>
+          </p:pic>
+          <p:cxnSp>
+            <p:nvCxnSpPr>
+              <p:cNvPr id="5" name="Straight Connector 4">
+                <a:extLst>
+                  <a:ext uri="{FF2B5EF4-FFF2-40B4-BE49-F238E27FC236}">
+                    <a16:creationId xmlns:a16="http://schemas.microsoft.com/office/drawing/2014/main" id="{DB2F7E1C-52C3-9226-8009-81DD9BC4C5A2}"/>
+                  </a:ext>
+                </a:extLst>
+              </p:cNvPr>
+              <p:cNvCxnSpPr/>
+              <p:nvPr/>
+            </p:nvCxnSpPr>
+            <p:spPr>
+              <a:xfrm>
+                <a:off x="1552353" y="637953"/>
+                <a:ext cx="10228521" cy="0"/>
+              </a:xfrm>
+              <a:prstGeom prst="line">
+                <a:avLst/>
+              </a:prstGeom>
+              <a:ln w="25400">
+                <a:solidFill>
+                  <a:schemeClr val="tx1"/>
+                </a:solidFill>
+                <a:prstDash val="sysDash"/>
+              </a:ln>
+            </p:spPr>
+            <p:style>
+              <a:lnRef idx="1">
+                <a:schemeClr val="accent1"/>
+              </a:lnRef>
+              <a:fillRef idx="0">
+                <a:schemeClr val="accent1"/>
+              </a:fillRef>
+              <a:effectRef idx="0">
+                <a:schemeClr val="accent1"/>
+              </a:effectRef>
+              <a:fontRef idx="minor">
+                <a:schemeClr val="tx1"/>
+              </a:fontRef>
+            </p:style>
+          </p:cxnSp>
+          <p:sp>
+            <p:nvSpPr>
+              <p:cNvPr id="6" name="Rectangle 5">
+                <a:extLst>
+                  <a:ext uri="{FF2B5EF4-FFF2-40B4-BE49-F238E27FC236}">
+                    <a16:creationId xmlns:a16="http://schemas.microsoft.com/office/drawing/2014/main" id="{2C771D19-B60D-6C9B-F01F-1D1E5E8A1E20}"/>
+                  </a:ext>
+                </a:extLst>
+              </p:cNvPr>
+              <p:cNvSpPr/>
+              <p:nvPr/>
+            </p:nvSpPr>
+            <p:spPr>
+              <a:xfrm>
+                <a:off x="5741581" y="659219"/>
+                <a:ext cx="5422604" cy="8867554"/>
+              </a:xfrm>
+              <a:prstGeom prst="rect">
+                <a:avLst/>
+              </a:prstGeom>
+              <a:solidFill>
+                <a:schemeClr val="tx2">
+                  <a:alpha val="50000"/>
+                </a:schemeClr>
+              </a:solidFill>
+              <a:ln>
+                <a:noFill/>
+              </a:ln>
+            </p:spPr>
+            <p:style>
+              <a:lnRef idx="2">
+                <a:schemeClr val="accent1">
+                  <a:shade val="50000"/>
+                </a:schemeClr>
+              </a:lnRef>
+              <a:fillRef idx="1">
+                <a:schemeClr val="accent1"/>
+              </a:fillRef>
+              <a:effectRef idx="0">
+                <a:schemeClr val="accent1"/>
+              </a:effectRef>
+              <a:fontRef idx="minor">
+                <a:schemeClr val="lt1"/>
+              </a:fontRef>
+            </p:style>
+            <p:txBody>
+              <a:bodyPr rtlCol="0" anchor="ctr"/>
+              <a:lstStyle/>
+              <a:p>
+                <a:pPr algn="ctr"/>
+                <a:endParaRPr lang="en-GB"/>
+              </a:p>
+            </p:txBody>
+          </p:sp>
+          <p:sp>
+            <p:nvSpPr>
+              <p:cNvPr id="7" name="Triangle 6">
+                <a:extLst>
+                  <a:ext uri="{FF2B5EF4-FFF2-40B4-BE49-F238E27FC236}">
+                    <a16:creationId xmlns:a16="http://schemas.microsoft.com/office/drawing/2014/main" id="{19F53E56-7C09-65C4-7698-83D42F9F256A}"/>
+                  </a:ext>
+                </a:extLst>
+              </p:cNvPr>
+              <p:cNvSpPr/>
+              <p:nvPr/>
+            </p:nvSpPr>
+            <p:spPr>
+              <a:xfrm flipV="1">
+                <a:off x="2169044" y="659218"/>
+                <a:ext cx="3572537" cy="8888820"/>
+              </a:xfrm>
+              <a:prstGeom prst="triangle">
+                <a:avLst>
+                  <a:gd name="adj" fmla="val 100000"/>
+                </a:avLst>
+              </a:prstGeom>
+              <a:solidFill>
+                <a:schemeClr val="tx2">
+                  <a:alpha val="50000"/>
+                </a:schemeClr>
+              </a:solidFill>
+              <a:ln>
+                <a:noFill/>
+              </a:ln>
+            </p:spPr>
+            <p:style>
+              <a:lnRef idx="2">
+                <a:schemeClr val="accent1">
+                  <a:shade val="50000"/>
+                </a:schemeClr>
+              </a:lnRef>
+              <a:fillRef idx="1">
+                <a:schemeClr val="accent1"/>
+              </a:fillRef>
+              <a:effectRef idx="0">
+                <a:schemeClr val="accent1"/>
+              </a:effectRef>
+              <a:fontRef idx="minor">
+                <a:schemeClr val="lt1"/>
+              </a:fontRef>
+            </p:style>
+            <p:txBody>
+              <a:bodyPr rtlCol="0" anchor="ctr"/>
+              <a:lstStyle/>
+              <a:p>
+                <a:pPr algn="ctr"/>
+                <a:endParaRPr lang="en-GB"/>
+              </a:p>
+            </p:txBody>
+          </p:sp>
+        </p:grpSp>
+        <p:sp>
+          <p:nvSpPr>
+            <p:cNvPr id="9" name="TextBox 8">
+              <a:extLst>
+                <a:ext uri="{FF2B5EF4-FFF2-40B4-BE49-F238E27FC236}">
+                  <a16:creationId xmlns:a16="http://schemas.microsoft.com/office/drawing/2014/main" id="{9AC22185-4EE5-25E0-8F38-80C678148152}"/>
+                </a:ext>
+              </a:extLst>
+            </p:cNvPr>
+            <p:cNvSpPr txBox="1"/>
+            <p:nvPr/>
+          </p:nvSpPr>
+          <p:spPr>
+            <a:xfrm>
+              <a:off x="5741581" y="2275367"/>
+              <a:ext cx="3742661" cy="1754326"/>
+            </a:xfrm>
+            <a:prstGeom prst="rect">
+              <a:avLst/>
+            </a:prstGeom>
+            <a:noFill/>
+          </p:spPr>
+          <p:txBody>
+            <a:bodyPr wrap="square" rtlCol="0">
+              <a:spAutoFit/>
+            </a:bodyPr>
+            <a:lstStyle/>
+            <a:p>
+              <a:pPr algn="ctr"/>
+              <a:r>
+                <a:rPr lang="en-GB" sz="3600" dirty="0"/>
+                <a:t>SD-years of subjective wellbeing lost</a:t>
+              </a:r>
+            </a:p>
+          </p:txBody>
+        </p:sp>
+        <p:sp>
+          <p:nvSpPr>
+            <p:cNvPr id="21" name="TextBox 20">
+              <a:extLst>
+                <a:ext uri="{FF2B5EF4-FFF2-40B4-BE49-F238E27FC236}">
+                  <a16:creationId xmlns:a16="http://schemas.microsoft.com/office/drawing/2014/main" id="{DFDF0830-D359-B69F-4201-4C24140911DB}"/>
+                </a:ext>
+              </a:extLst>
+            </p:cNvPr>
+            <p:cNvSpPr txBox="1"/>
+            <p:nvPr/>
+          </p:nvSpPr>
+          <p:spPr>
+            <a:xfrm>
+              <a:off x="5741581" y="9603896"/>
+              <a:ext cx="5422603" cy="461665"/>
+            </a:xfrm>
+            <a:prstGeom prst="rect">
+              <a:avLst/>
+            </a:prstGeom>
+            <a:noFill/>
+          </p:spPr>
+          <p:txBody>
+            <a:bodyPr wrap="square" rtlCol="0">
+              <a:spAutoFit/>
+            </a:bodyPr>
+            <a:lstStyle/>
+            <a:p>
+              <a:pPr algn="ctr"/>
+              <a:r>
+                <a:rPr lang="en-GB" sz="2400" dirty="0"/>
+                <a:t>Stabilised losses in adulthood</a:t>
+              </a:r>
+            </a:p>
+          </p:txBody>
+        </p:sp>
+        <p:sp>
+          <p:nvSpPr>
+            <p:cNvPr id="23" name="TextBox 22">
+              <a:extLst>
+                <a:ext uri="{FF2B5EF4-FFF2-40B4-BE49-F238E27FC236}">
+                  <a16:creationId xmlns:a16="http://schemas.microsoft.com/office/drawing/2014/main" id="{BADA84A3-570F-CBE1-3AE4-D66149EC6524}"/>
+                </a:ext>
+              </a:extLst>
+            </p:cNvPr>
+            <p:cNvSpPr txBox="1"/>
+            <p:nvPr/>
+          </p:nvSpPr>
+          <p:spPr>
+            <a:xfrm>
+              <a:off x="1892810" y="5566111"/>
+              <a:ext cx="2842433" cy="461665"/>
+            </a:xfrm>
+            <a:prstGeom prst="rect">
+              <a:avLst/>
+            </a:prstGeom>
+            <a:noFill/>
+          </p:spPr>
+          <p:txBody>
+            <a:bodyPr wrap="square" rtlCol="0">
+              <a:spAutoFit/>
+            </a:bodyPr>
+            <a:lstStyle/>
+            <a:p>
+              <a:pPr algn="ctr"/>
+              <a:r>
+                <a:rPr lang="en-GB" sz="2400" dirty="0"/>
+                <a:t>Losses grow</a:t>
+              </a:r>
+            </a:p>
+          </p:txBody>
+        </p:sp>
+      </p:grpSp>
+    </p:spTree>
+    <p:extLst>
+      <p:ext uri="{BB962C8B-B14F-4D97-AF65-F5344CB8AC3E}">
+        <p14:creationId xmlns:p14="http://schemas.microsoft.com/office/powerpoint/2010/main" val="1610701667"/>
       </p:ext>
     </p:extLst>
   </p:cSld>

</xml_diff>